<commit_message>
mise a jour diagramme et doc
</commit_message>
<xml_diff>
--- a/PW Presentations/DA.pptx
+++ b/PW Presentations/DA.pptx
@@ -243,7 +243,7 @@
           <a:p>
             <a:fld id="{621E251E-53A8-9E4F-948B-4D9ADE7517F5}" type="datetimeFigureOut">
               <a:rPr lang="fr-FR" smtClean="0"/>
-              <a:t>26/05/2021</a:t>
+              <a:t>31/05/2021</a:t>
             </a:fld>
             <a:endParaRPr lang="fr-FR"/>
           </a:p>
@@ -413,7 +413,7 @@
           <a:p>
             <a:fld id="{621E251E-53A8-9E4F-948B-4D9ADE7517F5}" type="datetimeFigureOut">
               <a:rPr lang="fr-FR" smtClean="0"/>
-              <a:t>26/05/2021</a:t>
+              <a:t>31/05/2021</a:t>
             </a:fld>
             <a:endParaRPr lang="fr-FR"/>
           </a:p>
@@ -593,7 +593,7 @@
           <a:p>
             <a:fld id="{621E251E-53A8-9E4F-948B-4D9ADE7517F5}" type="datetimeFigureOut">
               <a:rPr lang="fr-FR" smtClean="0"/>
-              <a:t>26/05/2021</a:t>
+              <a:t>31/05/2021</a:t>
             </a:fld>
             <a:endParaRPr lang="fr-FR"/>
           </a:p>
@@ -763,7 +763,7 @@
           <a:p>
             <a:fld id="{621E251E-53A8-9E4F-948B-4D9ADE7517F5}" type="datetimeFigureOut">
               <a:rPr lang="fr-FR" smtClean="0"/>
-              <a:t>26/05/2021</a:t>
+              <a:t>31/05/2021</a:t>
             </a:fld>
             <a:endParaRPr lang="fr-FR"/>
           </a:p>
@@ -1007,7 +1007,7 @@
           <a:p>
             <a:fld id="{621E251E-53A8-9E4F-948B-4D9ADE7517F5}" type="datetimeFigureOut">
               <a:rPr lang="fr-FR" smtClean="0"/>
-              <a:t>26/05/2021</a:t>
+              <a:t>31/05/2021</a:t>
             </a:fld>
             <a:endParaRPr lang="fr-FR"/>
           </a:p>
@@ -1239,7 +1239,7 @@
           <a:p>
             <a:fld id="{621E251E-53A8-9E4F-948B-4D9ADE7517F5}" type="datetimeFigureOut">
               <a:rPr lang="fr-FR" smtClean="0"/>
-              <a:t>26/05/2021</a:t>
+              <a:t>31/05/2021</a:t>
             </a:fld>
             <a:endParaRPr lang="fr-FR"/>
           </a:p>
@@ -1606,7 +1606,7 @@
           <a:p>
             <a:fld id="{621E251E-53A8-9E4F-948B-4D9ADE7517F5}" type="datetimeFigureOut">
               <a:rPr lang="fr-FR" smtClean="0"/>
-              <a:t>26/05/2021</a:t>
+              <a:t>31/05/2021</a:t>
             </a:fld>
             <a:endParaRPr lang="fr-FR"/>
           </a:p>
@@ -1724,7 +1724,7 @@
           <a:p>
             <a:fld id="{621E251E-53A8-9E4F-948B-4D9ADE7517F5}" type="datetimeFigureOut">
               <a:rPr lang="fr-FR" smtClean="0"/>
-              <a:t>26/05/2021</a:t>
+              <a:t>31/05/2021</a:t>
             </a:fld>
             <a:endParaRPr lang="fr-FR"/>
           </a:p>
@@ -1819,7 +1819,7 @@
           <a:p>
             <a:fld id="{621E251E-53A8-9E4F-948B-4D9ADE7517F5}" type="datetimeFigureOut">
               <a:rPr lang="fr-FR" smtClean="0"/>
-              <a:t>26/05/2021</a:t>
+              <a:t>31/05/2021</a:t>
             </a:fld>
             <a:endParaRPr lang="fr-FR"/>
           </a:p>
@@ -2096,7 +2096,7 @@
           <a:p>
             <a:fld id="{621E251E-53A8-9E4F-948B-4D9ADE7517F5}" type="datetimeFigureOut">
               <a:rPr lang="fr-FR" smtClean="0"/>
-              <a:t>26/05/2021</a:t>
+              <a:t>31/05/2021</a:t>
             </a:fld>
             <a:endParaRPr lang="fr-FR"/>
           </a:p>
@@ -2353,7 +2353,7 @@
           <a:p>
             <a:fld id="{621E251E-53A8-9E4F-948B-4D9ADE7517F5}" type="datetimeFigureOut">
               <a:rPr lang="fr-FR" smtClean="0"/>
-              <a:t>26/05/2021</a:t>
+              <a:t>31/05/2021</a:t>
             </a:fld>
             <a:endParaRPr lang="fr-FR"/>
           </a:p>
@@ -2566,7 +2566,7 @@
           <a:p>
             <a:fld id="{621E251E-53A8-9E4F-948B-4D9ADE7517F5}" type="datetimeFigureOut">
               <a:rPr lang="fr-FR" smtClean="0"/>
-              <a:t>26/05/2021</a:t>
+              <a:t>31/05/2021</a:t>
             </a:fld>
             <a:endParaRPr lang="fr-FR"/>
           </a:p>
@@ -2985,7 +2985,7 @@
         </p:nvSpPr>
         <p:spPr>
           <a:xfrm>
-            <a:off x="2157434" y="279991"/>
+            <a:off x="2157434" y="300772"/>
             <a:ext cx="2543132" cy="369332"/>
           </a:xfrm>
           <a:prstGeom prst="rect">
@@ -2999,6 +2999,7 @@
           </a:bodyPr>
           <a:lstStyle/>
           <a:p>
+            <a:pPr algn="ctr"/>
             <a:r>
               <a:rPr lang="fr-FR" dirty="0"/>
               <a:t>DIAGRAMME D’ACTIVITE </a:t>
@@ -3008,10 +3009,10 @@
       </p:sp>
       <p:pic>
         <p:nvPicPr>
-          <p:cNvPr id="3" name="Image 2">
+          <p:cNvPr id="4" name="Image 3">
             <a:extLst>
               <a:ext uri="{FF2B5EF4-FFF2-40B4-BE49-F238E27FC236}">
-                <a16:creationId xmlns:a16="http://schemas.microsoft.com/office/drawing/2014/main" id="{2BF9A19A-D648-0C4A-AE0E-2505AD029667}"/>
+                <a16:creationId xmlns:a16="http://schemas.microsoft.com/office/drawing/2014/main" id="{70609E19-2CB0-864E-A4F0-EDC00C117ED9}"/>
               </a:ext>
             </a:extLst>
           </p:cNvPr>
@@ -3028,8 +3029,8 @@
         </p:blipFill>
         <p:spPr>
           <a:xfrm>
-            <a:off x="778190" y="1173125"/>
-            <a:ext cx="5301619" cy="9845749"/>
+            <a:off x="1433945" y="881345"/>
+            <a:ext cx="4574371" cy="10429309"/>
           </a:xfrm>
           <a:prstGeom prst="rect">
             <a:avLst/>

</xml_diff>